<commit_message>
Ajout de courbes et correction de coquille
</commit_message>
<xml_diff>
--- a/CI_03_SimulationNumerique/02_ProblemesStationnaires/Cours/images/Figures.pptx
+++ b/CI_03_SimulationNumerique/02_ProblemesStationnaires/Cours/images/Figures.pptx
@@ -6,6 +6,7 @@
   </p:sldMasterIdLst>
   <p:sldIdLst>
     <p:sldId id="256" r:id="rId2"/>
+    <p:sldId id="257" r:id="rId3"/>
   </p:sldIdLst>
   <p:sldSz cx="9144000" cy="6858000" type="screen4x3"/>
   <p:notesSz cx="6858000" cy="9144000"/>
@@ -288,7 +289,7 @@
           <a:p>
             <a:fld id="{AA309A6D-C09C-4548-B29A-6CF363A7E532}" type="datetimeFigureOut">
               <a:rPr lang="fr-FR" smtClean="0"/>
-              <a:t>29/01/2014</a:t>
+              <a:t>01/02/2014</a:t>
             </a:fld>
             <a:endParaRPr lang="fr-BE"/>
           </a:p>
@@ -453,7 +454,7 @@
           <a:p>
             <a:fld id="{AA309A6D-C09C-4548-B29A-6CF363A7E532}" type="datetimeFigureOut">
               <a:rPr lang="fr-FR" smtClean="0"/>
-              <a:t>29/01/2014</a:t>
+              <a:t>01/02/2014</a:t>
             </a:fld>
             <a:endParaRPr lang="fr-BE"/>
           </a:p>
@@ -628,7 +629,7 @@
           <a:p>
             <a:fld id="{AA309A6D-C09C-4548-B29A-6CF363A7E532}" type="datetimeFigureOut">
               <a:rPr lang="fr-FR" smtClean="0"/>
-              <a:t>29/01/2014</a:t>
+              <a:t>01/02/2014</a:t>
             </a:fld>
             <a:endParaRPr lang="fr-BE"/>
           </a:p>
@@ -793,7 +794,7 @@
           <a:p>
             <a:fld id="{AA309A6D-C09C-4548-B29A-6CF363A7E532}" type="datetimeFigureOut">
               <a:rPr lang="fr-FR" smtClean="0"/>
-              <a:t>29/01/2014</a:t>
+              <a:t>01/02/2014</a:t>
             </a:fld>
             <a:endParaRPr lang="fr-BE"/>
           </a:p>
@@ -1034,7 +1035,7 @@
           <a:p>
             <a:fld id="{AA309A6D-C09C-4548-B29A-6CF363A7E532}" type="datetimeFigureOut">
               <a:rPr lang="fr-FR" smtClean="0"/>
-              <a:t>29/01/2014</a:t>
+              <a:t>01/02/2014</a:t>
             </a:fld>
             <a:endParaRPr lang="fr-BE"/>
           </a:p>
@@ -1317,7 +1318,7 @@
           <a:p>
             <a:fld id="{AA309A6D-C09C-4548-B29A-6CF363A7E532}" type="datetimeFigureOut">
               <a:rPr lang="fr-FR" smtClean="0"/>
-              <a:t>29/01/2014</a:t>
+              <a:t>01/02/2014</a:t>
             </a:fld>
             <a:endParaRPr lang="fr-BE"/>
           </a:p>
@@ -1734,7 +1735,7 @@
           <a:p>
             <a:fld id="{AA309A6D-C09C-4548-B29A-6CF363A7E532}" type="datetimeFigureOut">
               <a:rPr lang="fr-FR" smtClean="0"/>
-              <a:t>29/01/2014</a:t>
+              <a:t>01/02/2014</a:t>
             </a:fld>
             <a:endParaRPr lang="fr-BE"/>
           </a:p>
@@ -1847,7 +1848,7 @@
           <a:p>
             <a:fld id="{AA309A6D-C09C-4548-B29A-6CF363A7E532}" type="datetimeFigureOut">
               <a:rPr lang="fr-FR" smtClean="0"/>
-              <a:t>29/01/2014</a:t>
+              <a:t>01/02/2014</a:t>
             </a:fld>
             <a:endParaRPr lang="fr-BE"/>
           </a:p>
@@ -1937,7 +1938,7 @@
           <a:p>
             <a:fld id="{AA309A6D-C09C-4548-B29A-6CF363A7E532}" type="datetimeFigureOut">
               <a:rPr lang="fr-FR" smtClean="0"/>
-              <a:t>29/01/2014</a:t>
+              <a:t>01/02/2014</a:t>
             </a:fld>
             <a:endParaRPr lang="fr-BE"/>
           </a:p>
@@ -2209,7 +2210,7 @@
           <a:p>
             <a:fld id="{AA309A6D-C09C-4548-B29A-6CF363A7E532}" type="datetimeFigureOut">
               <a:rPr lang="fr-FR" smtClean="0"/>
-              <a:t>29/01/2014</a:t>
+              <a:t>01/02/2014</a:t>
             </a:fld>
             <a:endParaRPr lang="fr-BE"/>
           </a:p>
@@ -2457,7 +2458,7 @@
           <a:p>
             <a:fld id="{AA309A6D-C09C-4548-B29A-6CF363A7E532}" type="datetimeFigureOut">
               <a:rPr lang="fr-FR" smtClean="0"/>
-              <a:t>29/01/2014</a:t>
+              <a:t>01/02/2014</a:t>
             </a:fld>
             <a:endParaRPr lang="fr-BE"/>
           </a:p>
@@ -2665,7 +2666,7 @@
           <a:p>
             <a:fld id="{AA309A6D-C09C-4548-B29A-6CF363A7E532}" type="datetimeFigureOut">
               <a:rPr lang="fr-FR" smtClean="0"/>
-              <a:t>29/01/2014</a:t>
+              <a:t>01/02/2014</a:t>
             </a:fld>
             <a:endParaRPr lang="fr-BE"/>
           </a:p>
@@ -3223,8 +3224,8 @@
           </a:fontRef>
         </p:style>
       </p:cxnSp>
-      <mc:AlternateContent xmlns:mc="http://schemas.openxmlformats.org/markup-compatibility/2006">
-        <mc:Choice xmlns:a14="http://schemas.microsoft.com/office/drawing/2010/main" Requires="a14">
+      <mc:AlternateContent xmlns:mc="http://schemas.openxmlformats.org/markup-compatibility/2006" xmlns:a14="http://schemas.microsoft.com/office/drawing/2010/main">
+        <mc:Choice Requires="a14">
           <p:sp>
             <p:nvSpPr>
               <p:cNvPr id="15" name="ZoneTexte 14"/>
@@ -3247,6 +3248,7 @@
               </a:bodyPr>
               <a:lstStyle/>
               <a:p>
+                <a:pPr/>
                 <a14:m>
                   <m:oMathPara xmlns:m="http://schemas.openxmlformats.org/officeDocument/2006/math">
                     <m:oMathParaPr>
@@ -3279,7 +3281,7 @@
             </p:txBody>
           </p:sp>
         </mc:Choice>
-        <mc:Fallback>
+        <mc:Fallback xmlns="">
           <p:sp>
             <p:nvSpPr>
               <p:cNvPr id="15" name="ZoneTexte 14"/>
@@ -3318,8 +3320,8 @@
           </p:sp>
         </mc:Fallback>
       </mc:AlternateContent>
-      <mc:AlternateContent xmlns:mc="http://schemas.openxmlformats.org/markup-compatibility/2006">
-        <mc:Choice xmlns:a14="http://schemas.microsoft.com/office/drawing/2010/main" Requires="a14">
+      <mc:AlternateContent xmlns:mc="http://schemas.openxmlformats.org/markup-compatibility/2006" xmlns:a14="http://schemas.microsoft.com/office/drawing/2010/main">
+        <mc:Choice Requires="a14">
           <p:sp>
             <p:nvSpPr>
               <p:cNvPr id="16" name="ZoneTexte 15"/>
@@ -3342,6 +3344,7 @@
               </a:bodyPr>
               <a:lstStyle/>
               <a:p>
+                <a:pPr/>
                 <a14:m>
                   <m:oMathPara xmlns:m="http://schemas.openxmlformats.org/officeDocument/2006/math">
                     <m:oMathParaPr>
@@ -3374,7 +3377,7 @@
             </p:txBody>
           </p:sp>
         </mc:Choice>
-        <mc:Fallback>
+        <mc:Fallback xmlns="">
           <p:sp>
             <p:nvSpPr>
               <p:cNvPr id="16" name="ZoneTexte 15"/>
@@ -3613,8 +3616,8 @@
           </a:fontRef>
         </p:style>
       </p:cxnSp>
-      <mc:AlternateContent xmlns:mc="http://schemas.openxmlformats.org/markup-compatibility/2006">
-        <mc:Choice xmlns:a14="http://schemas.microsoft.com/office/drawing/2010/main" Requires="a14">
+      <mc:AlternateContent xmlns:mc="http://schemas.openxmlformats.org/markup-compatibility/2006" xmlns:a14="http://schemas.microsoft.com/office/drawing/2010/main">
+        <mc:Choice Requires="a14">
           <p:sp>
             <p:nvSpPr>
               <p:cNvPr id="35" name="ZoneTexte 34"/>
@@ -3637,6 +3640,7 @@
               </a:bodyPr>
               <a:lstStyle/>
               <a:p>
+                <a:pPr/>
                 <a14:m>
                   <m:oMathPara xmlns:m="http://schemas.openxmlformats.org/officeDocument/2006/math">
                     <m:oMathParaPr>
@@ -3657,7 +3661,7 @@
             </p:txBody>
           </p:sp>
         </mc:Choice>
-        <mc:Fallback>
+        <mc:Fallback xmlns="">
           <p:sp>
             <p:nvSpPr>
               <p:cNvPr id="35" name="ZoneTexte 34"/>
@@ -3696,8 +3700,8 @@
           </p:sp>
         </mc:Fallback>
       </mc:AlternateContent>
-      <mc:AlternateContent xmlns:mc="http://schemas.openxmlformats.org/markup-compatibility/2006">
-        <mc:Choice xmlns:a14="http://schemas.microsoft.com/office/drawing/2010/main" Requires="a14">
+      <mc:AlternateContent xmlns:mc="http://schemas.openxmlformats.org/markup-compatibility/2006" xmlns:a14="http://schemas.microsoft.com/office/drawing/2010/main">
+        <mc:Choice Requires="a14">
           <p:sp>
             <p:nvSpPr>
               <p:cNvPr id="36" name="ZoneTexte 35"/>
@@ -3720,6 +3724,7 @@
               </a:bodyPr>
               <a:lstStyle/>
               <a:p>
+                <a:pPr/>
                 <a14:m>
                   <m:oMathPara xmlns:m="http://schemas.openxmlformats.org/officeDocument/2006/math">
                     <m:oMathParaPr>
@@ -3740,7 +3745,7 @@
             </p:txBody>
           </p:sp>
         </mc:Choice>
-        <mc:Fallback>
+        <mc:Fallback xmlns="">
           <p:sp>
             <p:nvSpPr>
               <p:cNvPr id="36" name="ZoneTexte 35"/>
@@ -3779,8 +3784,8 @@
           </p:sp>
         </mc:Fallback>
       </mc:AlternateContent>
-      <mc:AlternateContent xmlns:mc="http://schemas.openxmlformats.org/markup-compatibility/2006">
-        <mc:Choice xmlns:a14="http://schemas.microsoft.com/office/drawing/2010/main" Requires="a14">
+      <mc:AlternateContent xmlns:mc="http://schemas.openxmlformats.org/markup-compatibility/2006" xmlns:a14="http://schemas.microsoft.com/office/drawing/2010/main">
+        <mc:Choice Requires="a14">
           <p:sp>
             <p:nvSpPr>
               <p:cNvPr id="45" name="ZoneTexte 44"/>
@@ -3803,6 +3808,7 @@
               </a:bodyPr>
               <a:lstStyle/>
               <a:p>
+                <a:pPr/>
                 <a14:m>
                   <m:oMathPara xmlns:m="http://schemas.openxmlformats.org/officeDocument/2006/math">
                     <m:oMathParaPr>
@@ -3885,7 +3891,7 @@
             </p:txBody>
           </p:sp>
         </mc:Choice>
-        <mc:Fallback>
+        <mc:Fallback xmlns="">
           <p:sp>
             <p:nvSpPr>
               <p:cNvPr id="45" name="ZoneTexte 44"/>
@@ -3924,8 +3930,8 @@
           </p:sp>
         </mc:Fallback>
       </mc:AlternateContent>
-      <mc:AlternateContent xmlns:mc="http://schemas.openxmlformats.org/markup-compatibility/2006">
-        <mc:Choice xmlns:a14="http://schemas.microsoft.com/office/drawing/2010/main" Requires="a14">
+      <mc:AlternateContent xmlns:mc="http://schemas.openxmlformats.org/markup-compatibility/2006" xmlns:a14="http://schemas.microsoft.com/office/drawing/2010/main">
+        <mc:Choice Requires="a14">
           <p:sp>
             <p:nvSpPr>
               <p:cNvPr id="50" name="ZoneTexte 49"/>
@@ -3948,6 +3954,7 @@
               </a:bodyPr>
               <a:lstStyle/>
               <a:p>
+                <a:pPr/>
                 <a14:m>
                   <m:oMathPara xmlns:m="http://schemas.openxmlformats.org/officeDocument/2006/math">
                     <m:oMathParaPr>
@@ -3997,7 +4004,7 @@
             </p:txBody>
           </p:sp>
         </mc:Choice>
-        <mc:Fallback>
+        <mc:Fallback xmlns="">
           <p:sp>
             <p:nvSpPr>
               <p:cNvPr id="50" name="ZoneTexte 49"/>
@@ -4081,8 +4088,8 @@
           </a:p>
         </p:txBody>
       </p:sp>
-      <mc:AlternateContent xmlns:mc="http://schemas.openxmlformats.org/markup-compatibility/2006">
-        <mc:Choice xmlns:a14="http://schemas.microsoft.com/office/drawing/2010/main" Requires="a14">
+      <mc:AlternateContent xmlns:mc="http://schemas.openxmlformats.org/markup-compatibility/2006" xmlns:a14="http://schemas.microsoft.com/office/drawing/2010/main">
+        <mc:Choice Requires="a14">
           <p:sp>
             <p:nvSpPr>
               <p:cNvPr id="52" name="ZoneTexte 51"/>
@@ -4105,6 +4112,7 @@
               </a:bodyPr>
               <a:lstStyle/>
               <a:p>
+                <a:pPr/>
                 <a14:m>
                   <m:oMathPara xmlns:m="http://schemas.openxmlformats.org/officeDocument/2006/math">
                     <m:oMathParaPr>
@@ -4144,7 +4152,7 @@
             </p:txBody>
           </p:sp>
         </mc:Choice>
-        <mc:Fallback>
+        <mc:Fallback xmlns="">
           <p:sp>
             <p:nvSpPr>
               <p:cNvPr id="52" name="ZoneTexte 51"/>
@@ -4183,8 +4191,8 @@
           </p:sp>
         </mc:Fallback>
       </mc:AlternateContent>
-      <mc:AlternateContent xmlns:mc="http://schemas.openxmlformats.org/markup-compatibility/2006">
-        <mc:Choice xmlns:a14="http://schemas.microsoft.com/office/drawing/2010/main" Requires="a14">
+      <mc:AlternateContent xmlns:mc="http://schemas.openxmlformats.org/markup-compatibility/2006" xmlns:a14="http://schemas.microsoft.com/office/drawing/2010/main">
+        <mc:Choice Requires="a14">
           <p:sp>
             <p:nvSpPr>
               <p:cNvPr id="53" name="ZoneTexte 52"/>
@@ -4207,6 +4215,7 @@
               </a:bodyPr>
               <a:lstStyle/>
               <a:p>
+                <a:pPr/>
                 <a14:m>
                   <m:oMathPara xmlns:m="http://schemas.openxmlformats.org/officeDocument/2006/math">
                     <m:oMathParaPr>
@@ -4227,7 +4236,7 @@
             </p:txBody>
           </p:sp>
         </mc:Choice>
-        <mc:Fallback>
+        <mc:Fallback xmlns="">
           <p:sp>
             <p:nvSpPr>
               <p:cNvPr id="53" name="ZoneTexte 52"/>
@@ -4270,6 +4279,339 @@
     <p:extLst>
       <p:ext uri="{BB962C8B-B14F-4D97-AF65-F5344CB8AC3E}">
         <p14:creationId xmlns:p14="http://schemas.microsoft.com/office/powerpoint/2010/main" val="386279422"/>
+      </p:ext>
+    </p:extLst>
+  </p:cSld>
+  <p:clrMapOvr>
+    <a:masterClrMapping/>
+  </p:clrMapOvr>
+</p:sld>
+</file>
+
+<file path=ppt/slides/slide2.xml><?xml version="1.0" encoding="utf-8"?>
+<p:sld xmlns:a="http://schemas.openxmlformats.org/drawingml/2006/main" xmlns:r="http://schemas.openxmlformats.org/officeDocument/2006/relationships" xmlns:p="http://schemas.openxmlformats.org/presentationml/2006/main">
+  <p:cSld>
+    <p:spTree>
+      <p:nvGrpSpPr>
+        <p:cNvPr id="1" name=""/>
+        <p:cNvGrpSpPr/>
+        <p:nvPr/>
+      </p:nvGrpSpPr>
+      <p:grpSpPr>
+        <a:xfrm>
+          <a:off x="0" y="0"/>
+          <a:ext cx="0" cy="0"/>
+          <a:chOff x="0" y="0"/>
+          <a:chExt cx="0" cy="0"/>
+        </a:xfrm>
+      </p:grpSpPr>
+      <p:pic>
+        <p:nvPicPr>
+          <p:cNvPr id="1026" name="Picture 2" descr="C:\Enseignements\GitHub\Informatique\CI_03_SimulationNumerique\02_ProblemesStationnaires\Cours\images\courbe_alpha.png"/>
+          <p:cNvPicPr>
+            <a:picLocks noChangeAspect="1" noChangeArrowheads="1"/>
+          </p:cNvPicPr>
+          <p:nvPr/>
+        </p:nvPicPr>
+        <p:blipFill>
+          <a:blip r:embed="rId2">
+            <a:extLst>
+              <a:ext uri="{28A0092B-C50C-407E-A947-70E740481C1C}">
+                <a14:useLocalDpi xmlns:a14="http://schemas.microsoft.com/office/drawing/2010/main" val="0"/>
+              </a:ext>
+            </a:extLst>
+          </a:blip>
+          <a:srcRect/>
+          <a:stretch>
+            <a:fillRect/>
+          </a:stretch>
+        </p:blipFill>
+        <p:spPr bwMode="auto">
+          <a:xfrm>
+            <a:off x="0" y="1679434"/>
+            <a:ext cx="3600000" cy="2716488"/>
+          </a:xfrm>
+          <a:prstGeom prst="rect">
+            <a:avLst/>
+          </a:prstGeom>
+          <a:noFill/>
+          <a:extLst>
+            <a:ext uri="{909E8E84-426E-40DD-AFC4-6F175D3DCCD1}">
+              <a14:hiddenFill xmlns:a14="http://schemas.microsoft.com/office/drawing/2010/main">
+                <a:solidFill>
+                  <a:srgbClr val="FFFFFF"/>
+                </a:solidFill>
+              </a14:hiddenFill>
+            </a:ext>
+          </a:extLst>
+        </p:spPr>
+      </p:pic>
+      <p:pic>
+        <p:nvPicPr>
+          <p:cNvPr id="1028" name="Picture 4" descr="C:\Enseignements\GitHub\Informatique\CI_03_SimulationNumerique\02_ProblemesStationnaires\Cours\images\Solutions.png"/>
+          <p:cNvPicPr>
+            <a:picLocks noChangeAspect="1" noChangeArrowheads="1"/>
+          </p:cNvPicPr>
+          <p:nvPr/>
+        </p:nvPicPr>
+        <p:blipFill>
+          <a:blip r:embed="rId3">
+            <a:extLst>
+              <a:ext uri="{28A0092B-C50C-407E-A947-70E740481C1C}">
+                <a14:useLocalDpi xmlns:a14="http://schemas.microsoft.com/office/drawing/2010/main" val="0"/>
+              </a:ext>
+            </a:extLst>
+          </a:blip>
+          <a:srcRect/>
+          <a:stretch>
+            <a:fillRect/>
+          </a:stretch>
+        </p:blipFill>
+        <p:spPr bwMode="auto">
+          <a:xfrm>
+            <a:off x="3419872" y="1679434"/>
+            <a:ext cx="3600000" cy="2716489"/>
+          </a:xfrm>
+          <a:prstGeom prst="rect">
+            <a:avLst/>
+          </a:prstGeom>
+          <a:noFill/>
+          <a:extLst>
+            <a:ext uri="{909E8E84-426E-40DD-AFC4-6F175D3DCCD1}">
+              <a14:hiddenFill xmlns:a14="http://schemas.microsoft.com/office/drawing/2010/main">
+                <a:solidFill>
+                  <a:srgbClr val="FFFFFF"/>
+                </a:solidFill>
+              </a14:hiddenFill>
+            </a:ext>
+          </a:extLst>
+        </p:spPr>
+      </p:pic>
+      <p:cxnSp>
+        <p:nvCxnSpPr>
+          <p:cNvPr id="5" name="Connecteur droit 4"/>
+          <p:cNvCxnSpPr/>
+          <p:nvPr/>
+        </p:nvCxnSpPr>
+        <p:spPr>
+          <a:xfrm>
+            <a:off x="467544" y="2924944"/>
+            <a:ext cx="2736304" cy="0"/>
+          </a:xfrm>
+          <a:prstGeom prst="line">
+            <a:avLst/>
+          </a:prstGeom>
+          <a:ln w="12700">
+            <a:solidFill>
+              <a:srgbClr val="FF0000"/>
+            </a:solidFill>
+          </a:ln>
+        </p:spPr>
+        <p:style>
+          <a:lnRef idx="1">
+            <a:schemeClr val="accent1"/>
+          </a:lnRef>
+          <a:fillRef idx="0">
+            <a:schemeClr val="accent1"/>
+          </a:fillRef>
+          <a:effectRef idx="0">
+            <a:schemeClr val="accent1"/>
+          </a:effectRef>
+          <a:fontRef idx="minor">
+            <a:schemeClr val="tx1"/>
+          </a:fontRef>
+        </p:style>
+      </p:cxnSp>
+      <p:sp>
+        <p:nvSpPr>
+          <p:cNvPr id="8" name="Ellipse 7"/>
+          <p:cNvSpPr/>
+          <p:nvPr/>
+        </p:nvSpPr>
+        <p:spPr>
+          <a:xfrm>
+            <a:off x="781865" y="2902084"/>
+            <a:ext cx="45719" cy="45719"/>
+          </a:xfrm>
+          <a:prstGeom prst="ellipse">
+            <a:avLst/>
+          </a:prstGeom>
+          <a:solidFill>
+            <a:srgbClr val="FF0000"/>
+          </a:solidFill>
+          <a:ln>
+            <a:noFill/>
+          </a:ln>
+        </p:spPr>
+        <p:style>
+          <a:lnRef idx="2">
+            <a:schemeClr val="accent1">
+              <a:shade val="50000"/>
+            </a:schemeClr>
+          </a:lnRef>
+          <a:fillRef idx="1">
+            <a:schemeClr val="accent1"/>
+          </a:fillRef>
+          <a:effectRef idx="0">
+            <a:schemeClr val="accent1"/>
+          </a:effectRef>
+          <a:fontRef idx="minor">
+            <a:schemeClr val="lt1"/>
+          </a:fontRef>
+        </p:style>
+        <p:txBody>
+          <a:bodyPr rtlCol="0" anchor="ctr"/>
+          <a:lstStyle/>
+          <a:p>
+            <a:pPr algn="ctr"/>
+            <a:endParaRPr lang="fr-FR"/>
+          </a:p>
+        </p:txBody>
+      </p:sp>
+      <p:sp>
+        <p:nvSpPr>
+          <p:cNvPr id="12" name="Ellipse 11"/>
+          <p:cNvSpPr/>
+          <p:nvPr/>
+        </p:nvSpPr>
+        <p:spPr>
+          <a:xfrm>
+            <a:off x="3158129" y="2899701"/>
+            <a:ext cx="45719" cy="45719"/>
+          </a:xfrm>
+          <a:prstGeom prst="ellipse">
+            <a:avLst/>
+          </a:prstGeom>
+          <a:solidFill>
+            <a:srgbClr val="FF0000"/>
+          </a:solidFill>
+          <a:ln>
+            <a:noFill/>
+          </a:ln>
+        </p:spPr>
+        <p:style>
+          <a:lnRef idx="2">
+            <a:schemeClr val="accent1">
+              <a:shade val="50000"/>
+            </a:schemeClr>
+          </a:lnRef>
+          <a:fillRef idx="1">
+            <a:schemeClr val="accent1"/>
+          </a:fillRef>
+          <a:effectRef idx="0">
+            <a:schemeClr val="accent1"/>
+          </a:effectRef>
+          <a:fontRef idx="minor">
+            <a:schemeClr val="lt1"/>
+          </a:fontRef>
+        </p:style>
+        <p:txBody>
+          <a:bodyPr rtlCol="0" anchor="ctr"/>
+          <a:lstStyle/>
+          <a:p>
+            <a:pPr algn="ctr"/>
+            <a:endParaRPr lang="fr-FR"/>
+          </a:p>
+        </p:txBody>
+      </p:sp>
+      <p:sp>
+        <p:nvSpPr>
+          <p:cNvPr id="9" name="Arc 8"/>
+          <p:cNvSpPr/>
+          <p:nvPr/>
+        </p:nvSpPr>
+        <p:spPr>
+          <a:xfrm>
+            <a:off x="3180988" y="2263727"/>
+            <a:ext cx="2952328" cy="1368152"/>
+          </a:xfrm>
+          <a:prstGeom prst="arc">
+            <a:avLst>
+              <a:gd name="adj1" fmla="val 10952957"/>
+              <a:gd name="adj2" fmla="val 15444455"/>
+            </a:avLst>
+          </a:prstGeom>
+          <a:ln>
+            <a:solidFill>
+              <a:srgbClr val="FF0000"/>
+            </a:solidFill>
+            <a:tailEnd type="stealth" w="sm" len="med"/>
+          </a:ln>
+        </p:spPr>
+        <p:style>
+          <a:lnRef idx="1">
+            <a:schemeClr val="accent1"/>
+          </a:lnRef>
+          <a:fillRef idx="0">
+            <a:schemeClr val="accent1"/>
+          </a:fillRef>
+          <a:effectRef idx="0">
+            <a:schemeClr val="accent1"/>
+          </a:effectRef>
+          <a:fontRef idx="minor">
+            <a:schemeClr val="tx1"/>
+          </a:fontRef>
+        </p:style>
+        <p:txBody>
+          <a:bodyPr rtlCol="0" anchor="ctr"/>
+          <a:lstStyle/>
+          <a:p>
+            <a:pPr algn="ctr"/>
+            <a:endParaRPr lang="fr-FR"/>
+          </a:p>
+        </p:txBody>
+      </p:sp>
+      <p:sp>
+        <p:nvSpPr>
+          <p:cNvPr id="14" name="Arc 13"/>
+          <p:cNvSpPr/>
+          <p:nvPr/>
+        </p:nvSpPr>
+        <p:spPr>
+          <a:xfrm flipV="1">
+            <a:off x="804724" y="2238484"/>
+            <a:ext cx="4847395" cy="1368152"/>
+          </a:xfrm>
+          <a:prstGeom prst="arc">
+            <a:avLst>
+              <a:gd name="adj1" fmla="val 10845527"/>
+              <a:gd name="adj2" fmla="val 20291971"/>
+            </a:avLst>
+          </a:prstGeom>
+          <a:ln>
+            <a:solidFill>
+              <a:srgbClr val="FF0000"/>
+            </a:solidFill>
+            <a:tailEnd type="stealth" w="sm" len="med"/>
+          </a:ln>
+        </p:spPr>
+        <p:style>
+          <a:lnRef idx="1">
+            <a:schemeClr val="accent1"/>
+          </a:lnRef>
+          <a:fillRef idx="0">
+            <a:schemeClr val="accent1"/>
+          </a:fillRef>
+          <a:effectRef idx="0">
+            <a:schemeClr val="accent1"/>
+          </a:effectRef>
+          <a:fontRef idx="minor">
+            <a:schemeClr val="tx1"/>
+          </a:fontRef>
+        </p:style>
+        <p:txBody>
+          <a:bodyPr rtlCol="0" anchor="ctr"/>
+          <a:lstStyle/>
+          <a:p>
+            <a:pPr algn="ctr"/>
+            <a:endParaRPr lang="fr-FR"/>
+          </a:p>
+        </p:txBody>
+      </p:sp>
+    </p:spTree>
+    <p:extLst>
+      <p:ext uri="{BB962C8B-B14F-4D97-AF65-F5344CB8AC3E}">
+        <p14:creationId xmlns:p14="http://schemas.microsoft.com/office/powerpoint/2010/main" val="3278686746"/>
       </p:ext>
     </p:extLst>
   </p:cSld>

</xml_diff>

<commit_message>
MAJ du cours et import TP intégration numérique
</commit_message>
<xml_diff>
--- a/CI_03_SimulationNumerique/02_ProblemesStationnaires/Cours/images/Figures.pptx
+++ b/CI_03_SimulationNumerique/02_ProblemesStationnaires/Cours/images/Figures.pptx
@@ -9,6 +9,7 @@
     <p:sldId id="257" r:id="rId3"/>
     <p:sldId id="258" r:id="rId4"/>
     <p:sldId id="259" r:id="rId5"/>
+    <p:sldId id="260" r:id="rId6"/>
   </p:sldIdLst>
   <p:sldSz cx="9144000" cy="6858000" type="screen4x3"/>
   <p:notesSz cx="6858000" cy="9144000"/>
@@ -291,7 +292,7 @@
           <a:p>
             <a:fld id="{AA309A6D-C09C-4548-B29A-6CF363A7E532}" type="datetimeFigureOut">
               <a:rPr lang="fr-FR" smtClean="0"/>
-              <a:t>02/02/2014</a:t>
+              <a:t>05/02/2014</a:t>
             </a:fld>
             <a:endParaRPr lang="fr-BE"/>
           </a:p>
@@ -456,7 +457,7 @@
           <a:p>
             <a:fld id="{AA309A6D-C09C-4548-B29A-6CF363A7E532}" type="datetimeFigureOut">
               <a:rPr lang="fr-FR" smtClean="0"/>
-              <a:t>02/02/2014</a:t>
+              <a:t>05/02/2014</a:t>
             </a:fld>
             <a:endParaRPr lang="fr-BE"/>
           </a:p>
@@ -631,7 +632,7 @@
           <a:p>
             <a:fld id="{AA309A6D-C09C-4548-B29A-6CF363A7E532}" type="datetimeFigureOut">
               <a:rPr lang="fr-FR" smtClean="0"/>
-              <a:t>02/02/2014</a:t>
+              <a:t>05/02/2014</a:t>
             </a:fld>
             <a:endParaRPr lang="fr-BE"/>
           </a:p>
@@ -796,7 +797,7 @@
           <a:p>
             <a:fld id="{AA309A6D-C09C-4548-B29A-6CF363A7E532}" type="datetimeFigureOut">
               <a:rPr lang="fr-FR" smtClean="0"/>
-              <a:t>02/02/2014</a:t>
+              <a:t>05/02/2014</a:t>
             </a:fld>
             <a:endParaRPr lang="fr-BE"/>
           </a:p>
@@ -1037,7 +1038,7 @@
           <a:p>
             <a:fld id="{AA309A6D-C09C-4548-B29A-6CF363A7E532}" type="datetimeFigureOut">
               <a:rPr lang="fr-FR" smtClean="0"/>
-              <a:t>02/02/2014</a:t>
+              <a:t>05/02/2014</a:t>
             </a:fld>
             <a:endParaRPr lang="fr-BE"/>
           </a:p>
@@ -1320,7 +1321,7 @@
           <a:p>
             <a:fld id="{AA309A6D-C09C-4548-B29A-6CF363A7E532}" type="datetimeFigureOut">
               <a:rPr lang="fr-FR" smtClean="0"/>
-              <a:t>02/02/2014</a:t>
+              <a:t>05/02/2014</a:t>
             </a:fld>
             <a:endParaRPr lang="fr-BE"/>
           </a:p>
@@ -1737,7 +1738,7 @@
           <a:p>
             <a:fld id="{AA309A6D-C09C-4548-B29A-6CF363A7E532}" type="datetimeFigureOut">
               <a:rPr lang="fr-FR" smtClean="0"/>
-              <a:t>02/02/2014</a:t>
+              <a:t>05/02/2014</a:t>
             </a:fld>
             <a:endParaRPr lang="fr-BE"/>
           </a:p>
@@ -1850,7 +1851,7 @@
           <a:p>
             <a:fld id="{AA309A6D-C09C-4548-B29A-6CF363A7E532}" type="datetimeFigureOut">
               <a:rPr lang="fr-FR" smtClean="0"/>
-              <a:t>02/02/2014</a:t>
+              <a:t>05/02/2014</a:t>
             </a:fld>
             <a:endParaRPr lang="fr-BE"/>
           </a:p>
@@ -1940,7 +1941,7 @@
           <a:p>
             <a:fld id="{AA309A6D-C09C-4548-B29A-6CF363A7E532}" type="datetimeFigureOut">
               <a:rPr lang="fr-FR" smtClean="0"/>
-              <a:t>02/02/2014</a:t>
+              <a:t>05/02/2014</a:t>
             </a:fld>
             <a:endParaRPr lang="fr-BE"/>
           </a:p>
@@ -2212,7 +2213,7 @@
           <a:p>
             <a:fld id="{AA309A6D-C09C-4548-B29A-6CF363A7E532}" type="datetimeFigureOut">
               <a:rPr lang="fr-FR" smtClean="0"/>
-              <a:t>02/02/2014</a:t>
+              <a:t>05/02/2014</a:t>
             </a:fld>
             <a:endParaRPr lang="fr-BE"/>
           </a:p>
@@ -2460,7 +2461,7 @@
           <a:p>
             <a:fld id="{AA309A6D-C09C-4548-B29A-6CF363A7E532}" type="datetimeFigureOut">
               <a:rPr lang="fr-FR" smtClean="0"/>
-              <a:t>02/02/2014</a:t>
+              <a:t>05/02/2014</a:t>
             </a:fld>
             <a:endParaRPr lang="fr-BE"/>
           </a:p>
@@ -2668,7 +2669,7 @@
           <a:p>
             <a:fld id="{AA309A6D-C09C-4548-B29A-6CF363A7E532}" type="datetimeFigureOut">
               <a:rPr lang="fr-FR" smtClean="0"/>
-              <a:t>02/02/2014</a:t>
+              <a:t>05/02/2014</a:t>
             </a:fld>
             <a:endParaRPr lang="fr-BE"/>
           </a:p>
@@ -5707,8 +5708,8 @@
           </a:fontRef>
         </p:style>
       </p:cxnSp>
-      <mc:AlternateContent xmlns:mc="http://schemas.openxmlformats.org/markup-compatibility/2006">
-        <mc:Choice xmlns:a14="http://schemas.microsoft.com/office/drawing/2010/main" Requires="a14">
+      <mc:AlternateContent xmlns:mc="http://schemas.openxmlformats.org/markup-compatibility/2006" xmlns:a14="http://schemas.microsoft.com/office/drawing/2010/main">
+        <mc:Choice Requires="a14">
           <p:sp>
             <p:nvSpPr>
               <p:cNvPr id="6" name="ZoneTexte 5"/>
@@ -5731,6 +5732,7 @@
               </a:bodyPr>
               <a:lstStyle/>
               <a:p>
+                <a:pPr/>
                 <a14:m>
                   <m:oMathPara xmlns:m="http://schemas.openxmlformats.org/officeDocument/2006/math">
                     <m:oMathParaPr>
@@ -5773,7 +5775,7 @@
             </p:txBody>
           </p:sp>
         </mc:Choice>
-        <mc:Fallback>
+        <mc:Fallback xmlns="">
           <p:sp>
             <p:nvSpPr>
               <p:cNvPr id="6" name="ZoneTexte 5"/>
@@ -5908,6 +5910,554 @@
     <p:extLst>
       <p:ext uri="{BB962C8B-B14F-4D97-AF65-F5344CB8AC3E}">
         <p14:creationId xmlns:p14="http://schemas.microsoft.com/office/powerpoint/2010/main" val="3517160411"/>
+      </p:ext>
+    </p:extLst>
+  </p:cSld>
+  <p:clrMapOvr>
+    <a:masterClrMapping/>
+  </p:clrMapOvr>
+</p:sld>
+</file>
+
+<file path=ppt/slides/slide5.xml><?xml version="1.0" encoding="utf-8"?>
+<p:sld xmlns:a="http://schemas.openxmlformats.org/drawingml/2006/main" xmlns:r="http://schemas.openxmlformats.org/officeDocument/2006/relationships" xmlns:p="http://schemas.openxmlformats.org/presentationml/2006/main">
+  <p:cSld>
+    <p:spTree>
+      <p:nvGrpSpPr>
+        <p:cNvPr id="1" name=""/>
+        <p:cNvGrpSpPr/>
+        <p:nvPr/>
+      </p:nvGrpSpPr>
+      <p:grpSpPr>
+        <a:xfrm>
+          <a:off x="0" y="0"/>
+          <a:ext cx="0" cy="0"/>
+          <a:chOff x="0" y="0"/>
+          <a:chExt cx="0" cy="0"/>
+        </a:xfrm>
+      </p:grpSpPr>
+      <p:pic>
+        <p:nvPicPr>
+          <p:cNvPr id="1026" name="Picture 2" descr="C:\Enseignements\GitHub\Informatique\CI_03_SimulationNumerique\02_ProblemesStationnaires\Cours\images\interpretation_newton.png"/>
+          <p:cNvPicPr>
+            <a:picLocks noChangeAspect="1" noChangeArrowheads="1"/>
+          </p:cNvPicPr>
+          <p:nvPr/>
+        </p:nvPicPr>
+        <p:blipFill>
+          <a:blip r:embed="rId2">
+            <a:extLst>
+              <a:ext uri="{28A0092B-C50C-407E-A947-70E740481C1C}">
+                <a14:useLocalDpi xmlns:a14="http://schemas.microsoft.com/office/drawing/2010/main" val="0"/>
+              </a:ext>
+            </a:extLst>
+          </a:blip>
+          <a:srcRect/>
+          <a:stretch>
+            <a:fillRect/>
+          </a:stretch>
+        </p:blipFill>
+        <p:spPr bwMode="auto">
+          <a:xfrm>
+            <a:off x="971600" y="548680"/>
+            <a:ext cx="7451726" cy="5622925"/>
+          </a:xfrm>
+          <a:prstGeom prst="rect">
+            <a:avLst/>
+          </a:prstGeom>
+          <a:noFill/>
+          <a:extLst>
+            <a:ext uri="{909E8E84-426E-40DD-AFC4-6F175D3DCCD1}">
+              <a14:hiddenFill xmlns:a14="http://schemas.microsoft.com/office/drawing/2010/main">
+                <a:solidFill>
+                  <a:srgbClr val="FFFFFF"/>
+                </a:solidFill>
+              </a14:hiddenFill>
+            </a:ext>
+          </a:extLst>
+        </p:spPr>
+      </p:pic>
+      <p:cxnSp>
+        <p:nvCxnSpPr>
+          <p:cNvPr id="5" name="Connecteur droit avec flèche 4"/>
+          <p:cNvCxnSpPr/>
+          <p:nvPr/>
+        </p:nvCxnSpPr>
+        <p:spPr>
+          <a:xfrm flipV="1">
+            <a:off x="1849551" y="3816750"/>
+            <a:ext cx="4680520" cy="360040"/>
+          </a:xfrm>
+          <a:prstGeom prst="straightConnector1">
+            <a:avLst/>
+          </a:prstGeom>
+          <a:ln w="28575">
+            <a:solidFill>
+              <a:srgbClr val="FF0000"/>
+            </a:solidFill>
+            <a:tailEnd type="stealth" w="med" len="lg"/>
+          </a:ln>
+        </p:spPr>
+        <p:style>
+          <a:lnRef idx="1">
+            <a:schemeClr val="accent1"/>
+          </a:lnRef>
+          <a:fillRef idx="0">
+            <a:schemeClr val="accent1"/>
+          </a:fillRef>
+          <a:effectRef idx="0">
+            <a:schemeClr val="accent1"/>
+          </a:effectRef>
+          <a:fontRef idx="minor">
+            <a:schemeClr val="tx1"/>
+          </a:fontRef>
+        </p:style>
+      </p:cxnSp>
+      <p:sp>
+        <p:nvSpPr>
+          <p:cNvPr id="6" name="Forme libre 5"/>
+          <p:cNvSpPr/>
+          <p:nvPr/>
+        </p:nvSpPr>
+        <p:spPr>
+          <a:xfrm>
+            <a:off x="6511636" y="2410690"/>
+            <a:ext cx="306636" cy="1399310"/>
+          </a:xfrm>
+          <a:custGeom>
+            <a:avLst/>
+            <a:gdLst>
+              <a:gd name="connsiteX0" fmla="*/ 0 w 309204"/>
+              <a:gd name="connsiteY0" fmla="*/ 1385455 h 1385455"/>
+              <a:gd name="connsiteX1" fmla="*/ 304800 w 309204"/>
+              <a:gd name="connsiteY1" fmla="*/ 651164 h 1385455"/>
+              <a:gd name="connsiteX2" fmla="*/ 152400 w 309204"/>
+              <a:gd name="connsiteY2" fmla="*/ 0 h 1385455"/>
+              <a:gd name="connsiteX0" fmla="*/ 0 w 305162"/>
+              <a:gd name="connsiteY0" fmla="*/ 1399310 h 1399310"/>
+              <a:gd name="connsiteX1" fmla="*/ 304800 w 305162"/>
+              <a:gd name="connsiteY1" fmla="*/ 665019 h 1399310"/>
+              <a:gd name="connsiteX2" fmla="*/ 55419 w 305162"/>
+              <a:gd name="connsiteY2" fmla="*/ 0 h 1399310"/>
+              <a:gd name="connsiteX0" fmla="*/ 0 w 306636"/>
+              <a:gd name="connsiteY0" fmla="*/ 1399310 h 1399310"/>
+              <a:gd name="connsiteX1" fmla="*/ 304800 w 306636"/>
+              <a:gd name="connsiteY1" fmla="*/ 665019 h 1399310"/>
+              <a:gd name="connsiteX2" fmla="*/ 55419 w 306636"/>
+              <a:gd name="connsiteY2" fmla="*/ 0 h 1399310"/>
+            </a:gdLst>
+            <a:ahLst/>
+            <a:cxnLst>
+              <a:cxn ang="0">
+                <a:pos x="connsiteX0" y="connsiteY0"/>
+              </a:cxn>
+              <a:cxn ang="0">
+                <a:pos x="connsiteX1" y="connsiteY1"/>
+              </a:cxn>
+              <a:cxn ang="0">
+                <a:pos x="connsiteX2" y="connsiteY2"/>
+              </a:cxn>
+            </a:cxnLst>
+            <a:rect l="l" t="t" r="r" b="b"/>
+            <a:pathLst>
+              <a:path w="306636" h="1399310">
+                <a:moveTo>
+                  <a:pt x="0" y="1399310"/>
+                </a:moveTo>
+                <a:cubicBezTo>
+                  <a:pt x="139700" y="1147619"/>
+                  <a:pt x="295564" y="898237"/>
+                  <a:pt x="304800" y="665019"/>
+                </a:cubicBezTo>
+                <a:cubicBezTo>
+                  <a:pt x="314036" y="431801"/>
+                  <a:pt x="296719" y="196272"/>
+                  <a:pt x="55419" y="0"/>
+                </a:cubicBezTo>
+              </a:path>
+            </a:pathLst>
+          </a:custGeom>
+          <a:noFill/>
+          <a:ln w="28575">
+            <a:solidFill>
+              <a:srgbClr val="FF0000"/>
+            </a:solidFill>
+            <a:tailEnd type="stealth" w="med" len="lg"/>
+          </a:ln>
+        </p:spPr>
+        <p:style>
+          <a:lnRef idx="2">
+            <a:schemeClr val="accent1">
+              <a:shade val="50000"/>
+            </a:schemeClr>
+          </a:lnRef>
+          <a:fillRef idx="1">
+            <a:schemeClr val="accent1"/>
+          </a:fillRef>
+          <a:effectRef idx="0">
+            <a:schemeClr val="accent1"/>
+          </a:effectRef>
+          <a:fontRef idx="minor">
+            <a:schemeClr val="lt1"/>
+          </a:fontRef>
+        </p:style>
+        <p:txBody>
+          <a:bodyPr rtlCol="0" anchor="ctr"/>
+          <a:lstStyle/>
+          <a:p>
+            <a:pPr algn="ctr"/>
+            <a:endParaRPr lang="fr-FR"/>
+          </a:p>
+        </p:txBody>
+      </p:sp>
+      <p:cxnSp>
+        <p:nvCxnSpPr>
+          <p:cNvPr id="8" name="Connecteur droit avec flèche 7"/>
+          <p:cNvCxnSpPr/>
+          <p:nvPr/>
+        </p:nvCxnSpPr>
+        <p:spPr>
+          <a:xfrm flipH="1">
+            <a:off x="4499992" y="2382980"/>
+            <a:ext cx="2030079" cy="1399310"/>
+          </a:xfrm>
+          <a:prstGeom prst="straightConnector1">
+            <a:avLst/>
+          </a:prstGeom>
+          <a:ln w="28575">
+            <a:solidFill>
+              <a:srgbClr val="00B050"/>
+            </a:solidFill>
+            <a:tailEnd type="stealth" w="med" len="lg"/>
+          </a:ln>
+        </p:spPr>
+        <p:style>
+          <a:lnRef idx="1">
+            <a:schemeClr val="accent1"/>
+          </a:lnRef>
+          <a:fillRef idx="0">
+            <a:schemeClr val="accent1"/>
+          </a:fillRef>
+          <a:effectRef idx="0">
+            <a:schemeClr val="accent1"/>
+          </a:effectRef>
+          <a:fontRef idx="minor">
+            <a:schemeClr val="tx1"/>
+          </a:fontRef>
+        </p:style>
+      </p:cxnSp>
+      <p:sp>
+        <p:nvSpPr>
+          <p:cNvPr id="11" name="Forme libre 10"/>
+          <p:cNvSpPr/>
+          <p:nvPr/>
+        </p:nvSpPr>
+        <p:spPr>
+          <a:xfrm flipH="1">
+            <a:off x="4250598" y="3573016"/>
+            <a:ext cx="228324" cy="243734"/>
+          </a:xfrm>
+          <a:custGeom>
+            <a:avLst/>
+            <a:gdLst>
+              <a:gd name="connsiteX0" fmla="*/ 0 w 309204"/>
+              <a:gd name="connsiteY0" fmla="*/ 1385455 h 1385455"/>
+              <a:gd name="connsiteX1" fmla="*/ 304800 w 309204"/>
+              <a:gd name="connsiteY1" fmla="*/ 651164 h 1385455"/>
+              <a:gd name="connsiteX2" fmla="*/ 152400 w 309204"/>
+              <a:gd name="connsiteY2" fmla="*/ 0 h 1385455"/>
+              <a:gd name="connsiteX0" fmla="*/ 0 w 305162"/>
+              <a:gd name="connsiteY0" fmla="*/ 1399310 h 1399310"/>
+              <a:gd name="connsiteX1" fmla="*/ 304800 w 305162"/>
+              <a:gd name="connsiteY1" fmla="*/ 665019 h 1399310"/>
+              <a:gd name="connsiteX2" fmla="*/ 55419 w 305162"/>
+              <a:gd name="connsiteY2" fmla="*/ 0 h 1399310"/>
+              <a:gd name="connsiteX0" fmla="*/ 0 w 306636"/>
+              <a:gd name="connsiteY0" fmla="*/ 1399310 h 1399310"/>
+              <a:gd name="connsiteX1" fmla="*/ 304800 w 306636"/>
+              <a:gd name="connsiteY1" fmla="*/ 665019 h 1399310"/>
+              <a:gd name="connsiteX2" fmla="*/ 55419 w 306636"/>
+              <a:gd name="connsiteY2" fmla="*/ 0 h 1399310"/>
+            </a:gdLst>
+            <a:ahLst/>
+            <a:cxnLst>
+              <a:cxn ang="0">
+                <a:pos x="connsiteX0" y="connsiteY0"/>
+              </a:cxn>
+              <a:cxn ang="0">
+                <a:pos x="connsiteX1" y="connsiteY1"/>
+              </a:cxn>
+              <a:cxn ang="0">
+                <a:pos x="connsiteX2" y="connsiteY2"/>
+              </a:cxn>
+            </a:cxnLst>
+            <a:rect l="l" t="t" r="r" b="b"/>
+            <a:pathLst>
+              <a:path w="306636" h="1399310">
+                <a:moveTo>
+                  <a:pt x="0" y="1399310"/>
+                </a:moveTo>
+                <a:cubicBezTo>
+                  <a:pt x="139700" y="1147619"/>
+                  <a:pt x="295564" y="898237"/>
+                  <a:pt x="304800" y="665019"/>
+                </a:cubicBezTo>
+                <a:cubicBezTo>
+                  <a:pt x="314036" y="431801"/>
+                  <a:pt x="296719" y="196272"/>
+                  <a:pt x="55419" y="0"/>
+                </a:cubicBezTo>
+              </a:path>
+            </a:pathLst>
+          </a:custGeom>
+          <a:noFill/>
+          <a:ln w="28575">
+            <a:solidFill>
+              <a:srgbClr val="00B050"/>
+            </a:solidFill>
+            <a:tailEnd type="stealth" w="med" len="lg"/>
+          </a:ln>
+        </p:spPr>
+        <p:style>
+          <a:lnRef idx="2">
+            <a:schemeClr val="accent1">
+              <a:shade val="50000"/>
+            </a:schemeClr>
+          </a:lnRef>
+          <a:fillRef idx="1">
+            <a:schemeClr val="accent1"/>
+          </a:fillRef>
+          <a:effectRef idx="0">
+            <a:schemeClr val="accent1"/>
+          </a:effectRef>
+          <a:fontRef idx="minor">
+            <a:schemeClr val="lt1"/>
+          </a:fontRef>
+        </p:style>
+        <p:txBody>
+          <a:bodyPr rtlCol="0" anchor="ctr"/>
+          <a:lstStyle/>
+          <a:p>
+            <a:pPr algn="ctr"/>
+            <a:endParaRPr lang="fr-FR"/>
+          </a:p>
+        </p:txBody>
+      </p:sp>
+      <p:cxnSp>
+        <p:nvCxnSpPr>
+          <p:cNvPr id="12" name="Connecteur droit avec flèche 11"/>
+          <p:cNvCxnSpPr/>
+          <p:nvPr/>
+        </p:nvCxnSpPr>
+        <p:spPr>
+          <a:xfrm flipH="1">
+            <a:off x="3779913" y="3573016"/>
+            <a:ext cx="584847" cy="243734"/>
+          </a:xfrm>
+          <a:prstGeom prst="straightConnector1">
+            <a:avLst/>
+          </a:prstGeom>
+          <a:ln w="28575">
+            <a:solidFill>
+              <a:srgbClr val="FFC000"/>
+            </a:solidFill>
+            <a:tailEnd type="stealth" w="med" len="lg"/>
+          </a:ln>
+        </p:spPr>
+        <p:style>
+          <a:lnRef idx="1">
+            <a:schemeClr val="accent1"/>
+          </a:lnRef>
+          <a:fillRef idx="0">
+            <a:schemeClr val="accent1"/>
+          </a:fillRef>
+          <a:effectRef idx="0">
+            <a:schemeClr val="accent1"/>
+          </a:effectRef>
+          <a:fontRef idx="minor">
+            <a:schemeClr val="tx1"/>
+          </a:fontRef>
+        </p:style>
+      </p:cxnSp>
+      <p:sp>
+        <p:nvSpPr>
+          <p:cNvPr id="13" name="Ellipse 12"/>
+          <p:cNvSpPr/>
+          <p:nvPr/>
+        </p:nvSpPr>
+        <p:spPr>
+          <a:xfrm>
+            <a:off x="6876256" y="2976527"/>
+            <a:ext cx="212216" cy="212216"/>
+          </a:xfrm>
+          <a:prstGeom prst="ellipse">
+            <a:avLst/>
+          </a:prstGeom>
+          <a:solidFill>
+            <a:schemeClr val="bg1"/>
+          </a:solidFill>
+          <a:ln w="19050">
+            <a:solidFill>
+              <a:srgbClr val="FF0000"/>
+            </a:solidFill>
+          </a:ln>
+        </p:spPr>
+        <p:style>
+          <a:lnRef idx="2">
+            <a:schemeClr val="accent1">
+              <a:shade val="50000"/>
+            </a:schemeClr>
+          </a:lnRef>
+          <a:fillRef idx="1">
+            <a:schemeClr val="accent1"/>
+          </a:fillRef>
+          <a:effectRef idx="0">
+            <a:schemeClr val="accent1"/>
+          </a:effectRef>
+          <a:fontRef idx="minor">
+            <a:schemeClr val="lt1"/>
+          </a:fontRef>
+        </p:style>
+        <p:txBody>
+          <a:bodyPr rtlCol="0" anchor="ctr"/>
+          <a:lstStyle/>
+          <a:p>
+            <a:pPr algn="ctr"/>
+            <a:r>
+              <a:rPr lang="fr-FR" sz="1200" dirty="0">
+                <a:solidFill>
+                  <a:srgbClr val="FF0000"/>
+                </a:solidFill>
+              </a:rPr>
+              <a:t>1</a:t>
+            </a:r>
+          </a:p>
+        </p:txBody>
+      </p:sp>
+      <p:sp>
+        <p:nvSpPr>
+          <p:cNvPr id="15" name="Ellipse 14"/>
+          <p:cNvSpPr/>
+          <p:nvPr/>
+        </p:nvSpPr>
+        <p:spPr>
+          <a:xfrm>
+            <a:off x="4056266" y="3710642"/>
+            <a:ext cx="212216" cy="212216"/>
+          </a:xfrm>
+          <a:prstGeom prst="ellipse">
+            <a:avLst/>
+          </a:prstGeom>
+          <a:solidFill>
+            <a:schemeClr val="bg1"/>
+          </a:solidFill>
+          <a:ln w="19050">
+            <a:solidFill>
+              <a:srgbClr val="00B050"/>
+            </a:solidFill>
+          </a:ln>
+        </p:spPr>
+        <p:style>
+          <a:lnRef idx="2">
+            <a:schemeClr val="accent1">
+              <a:shade val="50000"/>
+            </a:schemeClr>
+          </a:lnRef>
+          <a:fillRef idx="1">
+            <a:schemeClr val="accent1"/>
+          </a:fillRef>
+          <a:effectRef idx="0">
+            <a:schemeClr val="accent1"/>
+          </a:effectRef>
+          <a:fontRef idx="minor">
+            <a:schemeClr val="lt1"/>
+          </a:fontRef>
+        </p:style>
+        <p:txBody>
+          <a:bodyPr rtlCol="0" anchor="ctr"/>
+          <a:lstStyle/>
+          <a:p>
+            <a:pPr algn="ctr"/>
+            <a:r>
+              <a:rPr lang="fr-FR" sz="1200" dirty="0" smtClean="0">
+                <a:solidFill>
+                  <a:srgbClr val="00B050"/>
+                </a:solidFill>
+              </a:rPr>
+              <a:t>2</a:t>
+            </a:r>
+            <a:endParaRPr lang="fr-FR" sz="1200" dirty="0">
+              <a:solidFill>
+                <a:srgbClr val="00B050"/>
+              </a:solidFill>
+            </a:endParaRPr>
+          </a:p>
+        </p:txBody>
+      </p:sp>
+      <p:sp>
+        <p:nvSpPr>
+          <p:cNvPr id="16" name="Ellipse 15"/>
+          <p:cNvSpPr/>
+          <p:nvPr/>
+        </p:nvSpPr>
+        <p:spPr>
+          <a:xfrm>
+            <a:off x="3805640" y="3466908"/>
+            <a:ext cx="212216" cy="212216"/>
+          </a:xfrm>
+          <a:prstGeom prst="ellipse">
+            <a:avLst/>
+          </a:prstGeom>
+          <a:solidFill>
+            <a:schemeClr val="bg1"/>
+          </a:solidFill>
+          <a:ln w="19050">
+            <a:solidFill>
+              <a:srgbClr val="FFC000"/>
+            </a:solidFill>
+          </a:ln>
+        </p:spPr>
+        <p:style>
+          <a:lnRef idx="2">
+            <a:schemeClr val="accent1">
+              <a:shade val="50000"/>
+            </a:schemeClr>
+          </a:lnRef>
+          <a:fillRef idx="1">
+            <a:schemeClr val="accent1"/>
+          </a:fillRef>
+          <a:effectRef idx="0">
+            <a:schemeClr val="accent1"/>
+          </a:effectRef>
+          <a:fontRef idx="minor">
+            <a:schemeClr val="lt1"/>
+          </a:fontRef>
+        </p:style>
+        <p:txBody>
+          <a:bodyPr rtlCol="0" anchor="ctr"/>
+          <a:lstStyle/>
+          <a:p>
+            <a:pPr algn="ctr"/>
+            <a:r>
+              <a:rPr lang="fr-FR" sz="1200" dirty="0">
+                <a:solidFill>
+                  <a:srgbClr val="FFC000"/>
+                </a:solidFill>
+              </a:rPr>
+              <a:t>3</a:t>
+            </a:r>
+            <a:endParaRPr lang="fr-FR" sz="1200" dirty="0">
+              <a:solidFill>
+                <a:srgbClr val="FFC000"/>
+              </a:solidFill>
+            </a:endParaRPr>
+          </a:p>
+        </p:txBody>
+      </p:sp>
+    </p:spTree>
+    <p:extLst>
+      <p:ext uri="{BB962C8B-B14F-4D97-AF65-F5344CB8AC3E}">
+        <p14:creationId xmlns:p14="http://schemas.microsoft.com/office/powerpoint/2010/main" val="3498843023"/>
       </p:ext>
     </p:extLst>
   </p:cSld>

</xml_diff>